<commit_message>
Modified RPi hat powerpoint
</commit_message>
<xml_diff>
--- a/Active Projects/Twiggy Forrest Project/RPi/RPi hat.pptx
+++ b/Active Projects/Twiggy Forrest Project/RPi/RPi hat.pptx
@@ -2931,8 +2931,8 @@
         </p:nvGrpSpPr>
         <p:grpSpPr>
           <a:xfrm>
-            <a:off x="8989060" y="395605"/>
-            <a:ext cx="2573655" cy="2399665"/>
+            <a:off x="9118600" y="395605"/>
+            <a:ext cx="2444115" cy="2279015"/>
             <a:chOff x="3300" y="1225"/>
             <a:chExt cx="9336" cy="8702"/>
           </a:xfrm>

</xml_diff>